<commit_message>
zmiany w prezentacji boards
</commit_message>
<xml_diff>
--- a/P01_AzureDevOps/ProjP1_02_AzureDevOpsBoards.pptx
+++ b/P01_AzureDevOps/ProjP1_02_AzureDevOpsBoards.pptx
@@ -21,10 +21,14 @@
     <p:sldId id="282" r:id="rId15"/>
     <p:sldId id="269" r:id="rId16"/>
     <p:sldId id="274" r:id="rId17"/>
-    <p:sldId id="277" r:id="rId18"/>
-    <p:sldId id="290" r:id="rId19"/>
-    <p:sldId id="275" r:id="rId20"/>
-    <p:sldId id="276" r:id="rId21"/>
+    <p:sldId id="292" r:id="rId18"/>
+    <p:sldId id="291" r:id="rId19"/>
+    <p:sldId id="277" r:id="rId20"/>
+    <p:sldId id="290" r:id="rId21"/>
+    <p:sldId id="275" r:id="rId22"/>
+    <p:sldId id="276" r:id="rId23"/>
+    <p:sldId id="294" r:id="rId24"/>
+    <p:sldId id="293" r:id="rId25"/>
   </p:sldIdLst>
   <p:sldSz cx="12192000" cy="6858000"/>
   <p:notesSz cx="6858000" cy="9144000"/>
@@ -6758,195 +6762,34 @@
           <a:chExt cx="0" cy="0"/>
         </a:xfrm>
       </p:grpSpPr>
-      <p:sp>
-        <p:nvSpPr>
-          <p:cNvPr id="2" name="Title 1"/>
-          <p:cNvSpPr>
-            <a:spLocks noGrp="1"/>
-          </p:cNvSpPr>
-          <p:nvPr>
-            <p:ph type="title"/>
-          </p:nvPr>
-        </p:nvSpPr>
-        <p:spPr/>
-        <p:txBody>
-          <a:bodyPr/>
-          <a:lstStyle/>
-          <a:p>
-            <a:r>
-              <a:rPr lang="pl-PL" dirty="0" smtClean="0"/>
-              <a:t>Backlogs</a:t>
-            </a:r>
-            <a:endParaRPr lang="pl-PL" dirty="0"/>
-          </a:p>
-        </p:txBody>
-      </p:sp>
-      <p:sp>
-        <p:nvSpPr>
-          <p:cNvPr id="3" name="Rectangle 2"/>
-          <p:cNvSpPr/>
+      <p:pic>
+        <p:nvPicPr>
+          <p:cNvPr id="4" name="Picture 3"/>
+          <p:cNvPicPr>
+            <a:picLocks noChangeAspect="1"/>
+          </p:cNvPicPr>
           <p:nvPr/>
-        </p:nvSpPr>
+        </p:nvPicPr>
+        <p:blipFill>
+          <a:blip r:embed="rId2"/>
+          <a:stretch>
+            <a:fillRect/>
+          </a:stretch>
+        </p:blipFill>
         <p:spPr>
           <a:xfrm>
-            <a:off x="593124" y="1728053"/>
-            <a:ext cx="6096000" cy="1754326"/>
+            <a:off x="933707" y="1754145"/>
+            <a:ext cx="6419850" cy="3695700"/>
           </a:xfrm>
           <a:prstGeom prst="rect">
             <a:avLst/>
           </a:prstGeom>
         </p:spPr>
-        <p:txBody>
-          <a:bodyPr>
-            <a:spAutoFit/>
-          </a:bodyPr>
-          <a:lstStyle/>
-          <a:p>
-            <a:r>
-              <a:rPr lang="en-US" smtClean="0">
-                <a:solidFill>
-                  <a:srgbClr val="000000"/>
-                </a:solidFill>
-                <a:latin typeface="Segoe UI" panose="020B0502040204020203" pitchFamily="34" charset="0"/>
-              </a:rPr>
-              <a:t>An agile development team works off of a backlog of requirements, often called “user stories”. The backlog is prioritized so the most important user stories are at the top. The product owner owns the backlog and adds, changes, and reprioritizes user stories based on the customer’s needs.</a:t>
-            </a:r>
-            <a:endParaRPr lang="pl-PL" dirty="0"/>
-          </a:p>
-        </p:txBody>
-      </p:sp>
-      <p:sp>
-        <p:nvSpPr>
-          <p:cNvPr id="4" name="Rectangle 3"/>
-          <p:cNvSpPr/>
-          <p:nvPr/>
-        </p:nvSpPr>
-        <p:spPr>
-          <a:xfrm>
-            <a:off x="3048000" y="-495151"/>
-            <a:ext cx="6096000" cy="7848302"/>
-          </a:xfrm>
-          <a:prstGeom prst="rect">
-            <a:avLst/>
-          </a:prstGeom>
-        </p:spPr>
-        <p:txBody>
-          <a:bodyPr>
-            <a:spAutoFit/>
-          </a:bodyPr>
-          <a:lstStyle/>
-          <a:p>
-            <a:r>
-              <a:rPr lang="en-US" dirty="0">
-                <a:solidFill>
-                  <a:srgbClr val="000000"/>
-                </a:solidFill>
-                <a:latin typeface="Segoe UI" panose="020B0502040204020203" pitchFamily="34" charset="0"/>
-              </a:rPr>
-              <a:t>One of the biggest drags on an agile team’s productivity is a poorly defined backlog. A team cannot be expected to consistently deliver high quality software each sprint unless they have clearly defined requirements.</a:t>
-            </a:r>
-          </a:p>
-          <a:p>
-            <a:r>
-              <a:rPr lang="en-US" dirty="0">
-                <a:solidFill>
-                  <a:srgbClr val="000000"/>
-                </a:solidFill>
-                <a:latin typeface="Segoe UI" panose="020B0502040204020203" pitchFamily="34" charset="0"/>
-              </a:rPr>
-              <a:t>The product owner’s job is to ensure that every sprint, the engineers have clearly defined user stories to work with. The user stories at the top of the backlog should always be ready for the team to execute on. This is called backlog refinement. Keeping a backlog ready for an agile development team takes an incredible amount of effort and discipline.</a:t>
-            </a:r>
-          </a:p>
-          <a:p>
-            <a:r>
-              <a:rPr lang="en-US" dirty="0">
-                <a:solidFill>
-                  <a:srgbClr val="000000"/>
-                </a:solidFill>
-                <a:latin typeface="Segoe UI" panose="020B0502040204020203" pitchFamily="34" charset="0"/>
-              </a:rPr>
-              <a:t>When refining the backlog, remember the following:</a:t>
-            </a:r>
-          </a:p>
-          <a:p>
-            <a:r>
-              <a:rPr lang="en-US" b="1" dirty="0">
-                <a:solidFill>
-                  <a:srgbClr val="000000"/>
-                </a:solidFill>
-                <a:latin typeface="Segoe UI" panose="020B0502040204020203" pitchFamily="34" charset="0"/>
-              </a:rPr>
-              <a:t>Refining user stories is often a long-lead activity</a:t>
-            </a:r>
-          </a:p>
-          <a:p>
-            <a:r>
-              <a:rPr lang="en-US" dirty="0">
-                <a:solidFill>
-                  <a:srgbClr val="000000"/>
-                </a:solidFill>
-                <a:latin typeface="Segoe UI" panose="020B0502040204020203" pitchFamily="34" charset="0"/>
-              </a:rPr>
-              <a:t>Elegant user interfaces, beautiful screen designs, and customer delighting solutions all take time and energy to create. Diligent product owners refine user stories 2-3 sprints in advance. They account for design iterations and customer reviews. They work to ensure every user story is something the agile team is proud to deliver to the customer.</a:t>
-            </a:r>
-          </a:p>
-          <a:p>
-            <a:r>
-              <a:rPr lang="en-US" b="1" dirty="0">
-                <a:solidFill>
-                  <a:srgbClr val="000000"/>
-                </a:solidFill>
-                <a:latin typeface="Segoe UI" panose="020B0502040204020203" pitchFamily="34" charset="0"/>
-              </a:rPr>
-              <a:t>A user story is not refined unless the team says it is</a:t>
-            </a:r>
-          </a:p>
-          <a:p>
-            <a:r>
-              <a:rPr lang="en-US" dirty="0">
-                <a:solidFill>
-                  <a:srgbClr val="000000"/>
-                </a:solidFill>
-                <a:latin typeface="Segoe UI" panose="020B0502040204020203" pitchFamily="34" charset="0"/>
-              </a:rPr>
-              <a:t>The team needs to review the user story, and agree it’s ready to work on. If a team has not seen the user story until day 1 of a sprint, that’s a big red flag.</a:t>
-            </a:r>
-          </a:p>
-          <a:p>
-            <a:r>
-              <a:rPr lang="en-US" b="1" dirty="0">
-                <a:solidFill>
-                  <a:srgbClr val="000000"/>
-                </a:solidFill>
-                <a:latin typeface="Segoe UI" panose="020B0502040204020203" pitchFamily="34" charset="0"/>
-              </a:rPr>
-              <a:t>User stories further down the backlog can remain ambiguous</a:t>
-            </a:r>
-          </a:p>
-          <a:p>
-            <a:r>
-              <a:rPr lang="en-US" dirty="0">
-                <a:solidFill>
-                  <a:srgbClr val="000000"/>
-                </a:solidFill>
-                <a:latin typeface="Segoe UI" panose="020B0502040204020203" pitchFamily="34" charset="0"/>
-              </a:rPr>
-              <a:t>Don’t waste time refining lower priority items. Stay intently focused on the top of the backlog.</a:t>
-            </a:r>
-            <a:endParaRPr lang="en-US" b="0" i="0" dirty="0">
-              <a:solidFill>
-                <a:srgbClr val="000000"/>
-              </a:solidFill>
-              <a:effectLst/>
-              <a:latin typeface="Segoe UI" panose="020B0502040204020203" pitchFamily="34" charset="0"/>
-            </a:endParaRPr>
-          </a:p>
-        </p:txBody>
-      </p:sp>
+      </p:pic>
     </p:spTree>
     <p:extLst>
       <p:ext uri="{BB962C8B-B14F-4D97-AF65-F5344CB8AC3E}">
-        <p14:creationId xmlns:p14="http://schemas.microsoft.com/office/powerpoint/2010/main" val="1530026885"/>
+        <p14:creationId xmlns:p14="http://schemas.microsoft.com/office/powerpoint/2010/main" val="3375790791"/>
       </p:ext>
     </p:extLst>
   </p:cSld>
@@ -6973,57 +6816,51 @@
           <a:chExt cx="0" cy="0"/>
         </a:xfrm>
       </p:grpSpPr>
-      <p:sp>
-        <p:nvSpPr>
-          <p:cNvPr id="2" name="Title 1"/>
-          <p:cNvSpPr>
-            <a:spLocks noGrp="1"/>
-          </p:cNvSpPr>
-          <p:nvPr>
-            <p:ph type="title"/>
-          </p:nvPr>
-        </p:nvSpPr>
-        <p:spPr/>
-        <p:txBody>
-          <a:bodyPr/>
-          <a:lstStyle/>
-          <a:p>
-            <a:endParaRPr lang="pl-PL"/>
-          </a:p>
-        </p:txBody>
-      </p:sp>
-      <p:sp>
-        <p:nvSpPr>
-          <p:cNvPr id="3" name="Rectangle 2"/>
-          <p:cNvSpPr/>
+      <p:pic>
+        <p:nvPicPr>
+          <p:cNvPr id="1026" name="Picture 2" descr="Agile process work item types"/>
+          <p:cNvPicPr>
+            <a:picLocks noChangeAspect="1" noChangeArrowheads="1"/>
+          </p:cNvPicPr>
           <p:nvPr/>
-        </p:nvSpPr>
-        <p:spPr>
+        </p:nvPicPr>
+        <p:blipFill>
+          <a:blip r:embed="rId2">
+            <a:extLst>
+              <a:ext uri="{28A0092B-C50C-407E-A947-70E740481C1C}">
+                <a14:useLocalDpi xmlns:a14="http://schemas.microsoft.com/office/drawing/2010/main" val="0"/>
+              </a:ext>
+            </a:extLst>
+          </a:blip>
+          <a:srcRect/>
+          <a:stretch>
+            <a:fillRect/>
+          </a:stretch>
+        </p:blipFill>
+        <p:spPr bwMode="auto">
           <a:xfrm>
-            <a:off x="3048000" y="3105835"/>
-            <a:ext cx="6096000" cy="646331"/>
+            <a:off x="677334" y="2382109"/>
+            <a:ext cx="6667500" cy="4257675"/>
           </a:xfrm>
           <a:prstGeom prst="rect">
             <a:avLst/>
           </a:prstGeom>
+          <a:noFill/>
+          <a:extLst>
+            <a:ext uri="{909E8E84-426E-40DD-AFC4-6F175D3DCCD1}">
+              <a14:hiddenFill xmlns:a14="http://schemas.microsoft.com/office/drawing/2010/main">
+                <a:solidFill>
+                  <a:srgbClr val="FFFFFF"/>
+                </a:solidFill>
+              </a14:hiddenFill>
+            </a:ext>
+          </a:extLst>
         </p:spPr>
-        <p:txBody>
-          <a:bodyPr>
-            <a:spAutoFit/>
-          </a:bodyPr>
-          <a:lstStyle/>
-          <a:p>
-            <a:r>
-              <a:rPr lang="pl-PL" dirty="0"/>
-              <a:t>https://docs.microsoft.com/en-us/azure/devops/boards/backlogs/</a:t>
-            </a:r>
-          </a:p>
-        </p:txBody>
-      </p:sp>
+      </p:pic>
     </p:spTree>
     <p:extLst>
       <p:ext uri="{BB962C8B-B14F-4D97-AF65-F5344CB8AC3E}">
-        <p14:creationId xmlns:p14="http://schemas.microsoft.com/office/powerpoint/2010/main" val="1123735519"/>
+        <p14:creationId xmlns:p14="http://schemas.microsoft.com/office/powerpoint/2010/main" val="1279046018"/>
       </p:ext>
     </p:extLst>
   </p:cSld>
@@ -7067,16 +6904,178 @@
           <a:p>
             <a:r>
               <a:rPr lang="pl-PL" dirty="0" smtClean="0"/>
-              <a:t>Sprints</a:t>
+              <a:t>Backlogs</a:t>
             </a:r>
             <a:endParaRPr lang="pl-PL" dirty="0"/>
+          </a:p>
+        </p:txBody>
+      </p:sp>
+      <p:sp>
+        <p:nvSpPr>
+          <p:cNvPr id="3" name="Rectangle 2"/>
+          <p:cNvSpPr/>
+          <p:nvPr/>
+        </p:nvSpPr>
+        <p:spPr>
+          <a:xfrm>
+            <a:off x="593124" y="1728053"/>
+            <a:ext cx="6096000" cy="1754326"/>
+          </a:xfrm>
+          <a:prstGeom prst="rect">
+            <a:avLst/>
+          </a:prstGeom>
+        </p:spPr>
+        <p:txBody>
+          <a:bodyPr>
+            <a:spAutoFit/>
+          </a:bodyPr>
+          <a:lstStyle/>
+          <a:p>
+            <a:r>
+              <a:rPr lang="en-US" smtClean="0">
+                <a:solidFill>
+                  <a:srgbClr val="000000"/>
+                </a:solidFill>
+                <a:latin typeface="Segoe UI" panose="020B0502040204020203" pitchFamily="34" charset="0"/>
+              </a:rPr>
+              <a:t>An agile development team works off of a backlog of requirements, often called “user stories”. The backlog is prioritized so the most important user stories are at the top. The product owner owns the backlog and adds, changes, and reprioritizes user stories based on the customer’s needs.</a:t>
+            </a:r>
+            <a:endParaRPr lang="pl-PL" dirty="0"/>
+          </a:p>
+        </p:txBody>
+      </p:sp>
+      <p:sp>
+        <p:nvSpPr>
+          <p:cNvPr id="4" name="Rectangle 3"/>
+          <p:cNvSpPr/>
+          <p:nvPr/>
+        </p:nvSpPr>
+        <p:spPr>
+          <a:xfrm>
+            <a:off x="3048000" y="-495151"/>
+            <a:ext cx="6096000" cy="7848302"/>
+          </a:xfrm>
+          <a:prstGeom prst="rect">
+            <a:avLst/>
+          </a:prstGeom>
+        </p:spPr>
+        <p:txBody>
+          <a:bodyPr>
+            <a:spAutoFit/>
+          </a:bodyPr>
+          <a:lstStyle/>
+          <a:p>
+            <a:r>
+              <a:rPr lang="en-US" dirty="0">
+                <a:solidFill>
+                  <a:srgbClr val="000000"/>
+                </a:solidFill>
+                <a:latin typeface="Segoe UI" panose="020B0502040204020203" pitchFamily="34" charset="0"/>
+              </a:rPr>
+              <a:t>One of the biggest drags on an agile team’s productivity is a poorly defined backlog. A team cannot be expected to consistently deliver high quality software each sprint unless they have clearly defined requirements.</a:t>
+            </a:r>
+          </a:p>
+          <a:p>
+            <a:r>
+              <a:rPr lang="en-US" dirty="0">
+                <a:solidFill>
+                  <a:srgbClr val="000000"/>
+                </a:solidFill>
+                <a:latin typeface="Segoe UI" panose="020B0502040204020203" pitchFamily="34" charset="0"/>
+              </a:rPr>
+              <a:t>The product owner’s job is to ensure that every sprint, the engineers have clearly defined user stories to work with. The user stories at the top of the backlog should always be ready for the team to execute on. This is called backlog refinement. Keeping a backlog ready for an agile development team takes an incredible amount of effort and discipline.</a:t>
+            </a:r>
+          </a:p>
+          <a:p>
+            <a:r>
+              <a:rPr lang="en-US" dirty="0">
+                <a:solidFill>
+                  <a:srgbClr val="000000"/>
+                </a:solidFill>
+                <a:latin typeface="Segoe UI" panose="020B0502040204020203" pitchFamily="34" charset="0"/>
+              </a:rPr>
+              <a:t>When refining the backlog, remember the following:</a:t>
+            </a:r>
+          </a:p>
+          <a:p>
+            <a:r>
+              <a:rPr lang="en-US" b="1" dirty="0">
+                <a:solidFill>
+                  <a:srgbClr val="000000"/>
+                </a:solidFill>
+                <a:latin typeface="Segoe UI" panose="020B0502040204020203" pitchFamily="34" charset="0"/>
+              </a:rPr>
+              <a:t>Refining user stories is often a long-lead activity</a:t>
+            </a:r>
+          </a:p>
+          <a:p>
+            <a:r>
+              <a:rPr lang="en-US" dirty="0">
+                <a:solidFill>
+                  <a:srgbClr val="000000"/>
+                </a:solidFill>
+                <a:latin typeface="Segoe UI" panose="020B0502040204020203" pitchFamily="34" charset="0"/>
+              </a:rPr>
+              <a:t>Elegant user interfaces, beautiful screen designs, and customer delighting solutions all take time and energy to create. Diligent product owners refine user stories 2-3 sprints in advance. They account for design iterations and customer reviews. They work to ensure every user story is something the agile team is proud to deliver to the customer.</a:t>
+            </a:r>
+          </a:p>
+          <a:p>
+            <a:r>
+              <a:rPr lang="en-US" b="1" dirty="0">
+                <a:solidFill>
+                  <a:srgbClr val="000000"/>
+                </a:solidFill>
+                <a:latin typeface="Segoe UI" panose="020B0502040204020203" pitchFamily="34" charset="0"/>
+              </a:rPr>
+              <a:t>A user story is not refined unless the team says it is</a:t>
+            </a:r>
+          </a:p>
+          <a:p>
+            <a:r>
+              <a:rPr lang="en-US" dirty="0">
+                <a:solidFill>
+                  <a:srgbClr val="000000"/>
+                </a:solidFill>
+                <a:latin typeface="Segoe UI" panose="020B0502040204020203" pitchFamily="34" charset="0"/>
+              </a:rPr>
+              <a:t>The team needs to review the user story, and agree it’s ready to work on. If a team has not seen the user story until day 1 of a sprint, that’s a big red flag.</a:t>
+            </a:r>
+          </a:p>
+          <a:p>
+            <a:r>
+              <a:rPr lang="en-US" b="1" dirty="0">
+                <a:solidFill>
+                  <a:srgbClr val="000000"/>
+                </a:solidFill>
+                <a:latin typeface="Segoe UI" panose="020B0502040204020203" pitchFamily="34" charset="0"/>
+              </a:rPr>
+              <a:t>User stories further down the backlog can remain ambiguous</a:t>
+            </a:r>
+          </a:p>
+          <a:p>
+            <a:r>
+              <a:rPr lang="en-US" dirty="0">
+                <a:solidFill>
+                  <a:srgbClr val="000000"/>
+                </a:solidFill>
+                <a:latin typeface="Segoe UI" panose="020B0502040204020203" pitchFamily="34" charset="0"/>
+              </a:rPr>
+              <a:t>Don’t waste time refining lower priority items. Stay intently focused on the top of the backlog.</a:t>
+            </a:r>
+            <a:endParaRPr lang="en-US" b="0" i="0" dirty="0">
+              <a:solidFill>
+                <a:srgbClr val="000000"/>
+              </a:solidFill>
+              <a:effectLst/>
+              <a:latin typeface="Segoe UI" panose="020B0502040204020203" pitchFamily="34" charset="0"/>
+            </a:endParaRPr>
           </a:p>
         </p:txBody>
       </p:sp>
     </p:spTree>
     <p:extLst>
       <p:ext uri="{BB962C8B-B14F-4D97-AF65-F5344CB8AC3E}">
-        <p14:creationId xmlns:p14="http://schemas.microsoft.com/office/powerpoint/2010/main" val="2969481218"/>
+        <p14:creationId xmlns:p14="http://schemas.microsoft.com/office/powerpoint/2010/main" val="1530026885"/>
       </p:ext>
     </p:extLst>
   </p:cSld>
@@ -7190,6 +7189,184 @@
           <a:bodyPr/>
           <a:lstStyle/>
           <a:p>
+            <a:endParaRPr lang="pl-PL"/>
+          </a:p>
+        </p:txBody>
+      </p:sp>
+      <p:sp>
+        <p:nvSpPr>
+          <p:cNvPr id="3" name="Rectangle 2"/>
+          <p:cNvSpPr/>
+          <p:nvPr/>
+        </p:nvSpPr>
+        <p:spPr>
+          <a:xfrm>
+            <a:off x="3048000" y="3105835"/>
+            <a:ext cx="6096000" cy="646331"/>
+          </a:xfrm>
+          <a:prstGeom prst="rect">
+            <a:avLst/>
+          </a:prstGeom>
+        </p:spPr>
+        <p:txBody>
+          <a:bodyPr>
+            <a:spAutoFit/>
+          </a:bodyPr>
+          <a:lstStyle/>
+          <a:p>
+            <a:r>
+              <a:rPr lang="pl-PL" dirty="0"/>
+              <a:t>https://docs.microsoft.com/en-us/azure/devops/boards/backlogs/</a:t>
+            </a:r>
+          </a:p>
+        </p:txBody>
+      </p:sp>
+    </p:spTree>
+    <p:extLst>
+      <p:ext uri="{BB962C8B-B14F-4D97-AF65-F5344CB8AC3E}">
+        <p14:creationId xmlns:p14="http://schemas.microsoft.com/office/powerpoint/2010/main" val="1123735519"/>
+      </p:ext>
+    </p:extLst>
+  </p:cSld>
+  <p:clrMapOvr>
+    <a:masterClrMapping/>
+  </p:clrMapOvr>
+</p:sld>
+</file>
+
+<file path=ppt/slides/slide21.xml><?xml version="1.0" encoding="utf-8"?>
+<p:sld xmlns:a="http://schemas.openxmlformats.org/drawingml/2006/main" xmlns:r="http://schemas.openxmlformats.org/officeDocument/2006/relationships" xmlns:p="http://schemas.openxmlformats.org/presentationml/2006/main">
+  <p:cSld>
+    <p:spTree>
+      <p:nvGrpSpPr>
+        <p:cNvPr id="1" name=""/>
+        <p:cNvGrpSpPr/>
+        <p:nvPr/>
+      </p:nvGrpSpPr>
+      <p:grpSpPr>
+        <a:xfrm>
+          <a:off x="0" y="0"/>
+          <a:ext cx="0" cy="0"/>
+          <a:chOff x="0" y="0"/>
+          <a:chExt cx="0" cy="0"/>
+        </a:xfrm>
+      </p:grpSpPr>
+      <p:sp>
+        <p:nvSpPr>
+          <p:cNvPr id="2" name="Title 1"/>
+          <p:cNvSpPr>
+            <a:spLocks noGrp="1"/>
+          </p:cNvSpPr>
+          <p:nvPr>
+            <p:ph type="title"/>
+          </p:nvPr>
+        </p:nvSpPr>
+        <p:spPr/>
+        <p:txBody>
+          <a:bodyPr/>
+          <a:lstStyle/>
+          <a:p>
+            <a:r>
+              <a:rPr lang="pl-PL" dirty="0" smtClean="0"/>
+              <a:t>Sprints</a:t>
+            </a:r>
+            <a:endParaRPr lang="pl-PL" dirty="0"/>
+          </a:p>
+        </p:txBody>
+      </p:sp>
+      <p:pic>
+        <p:nvPicPr>
+          <p:cNvPr id="3" name="Picture 2"/>
+          <p:cNvPicPr>
+            <a:picLocks noChangeAspect="1"/>
+          </p:cNvPicPr>
+          <p:nvPr/>
+        </p:nvPicPr>
+        <p:blipFill>
+          <a:blip r:embed="rId2"/>
+          <a:stretch>
+            <a:fillRect/>
+          </a:stretch>
+        </p:blipFill>
+        <p:spPr>
+          <a:xfrm>
+            <a:off x="1076325" y="1133475"/>
+            <a:ext cx="10039350" cy="4591050"/>
+          </a:xfrm>
+          <a:prstGeom prst="rect">
+            <a:avLst/>
+          </a:prstGeom>
+        </p:spPr>
+      </p:pic>
+      <p:pic>
+        <p:nvPicPr>
+          <p:cNvPr id="4" name="Picture 3"/>
+          <p:cNvPicPr>
+            <a:picLocks noChangeAspect="1"/>
+          </p:cNvPicPr>
+          <p:nvPr/>
+        </p:nvPicPr>
+        <p:blipFill>
+          <a:blip r:embed="rId3"/>
+          <a:stretch>
+            <a:fillRect/>
+          </a:stretch>
+        </p:blipFill>
+        <p:spPr>
+          <a:xfrm>
+            <a:off x="0" y="1800213"/>
+            <a:ext cx="12192000" cy="3257573"/>
+          </a:xfrm>
+          <a:prstGeom prst="rect">
+            <a:avLst/>
+          </a:prstGeom>
+        </p:spPr>
+      </p:pic>
+    </p:spTree>
+    <p:extLst>
+      <p:ext uri="{BB962C8B-B14F-4D97-AF65-F5344CB8AC3E}">
+        <p14:creationId xmlns:p14="http://schemas.microsoft.com/office/powerpoint/2010/main" val="2969481218"/>
+      </p:ext>
+    </p:extLst>
+  </p:cSld>
+  <p:clrMapOvr>
+    <a:masterClrMapping/>
+  </p:clrMapOvr>
+</p:sld>
+</file>
+
+<file path=ppt/slides/slide22.xml><?xml version="1.0" encoding="utf-8"?>
+<p:sld xmlns:a="http://schemas.openxmlformats.org/drawingml/2006/main" xmlns:r="http://schemas.openxmlformats.org/officeDocument/2006/relationships" xmlns:p="http://schemas.openxmlformats.org/presentationml/2006/main">
+  <p:cSld>
+    <p:spTree>
+      <p:nvGrpSpPr>
+        <p:cNvPr id="1" name=""/>
+        <p:cNvGrpSpPr/>
+        <p:nvPr/>
+      </p:nvGrpSpPr>
+      <p:grpSpPr>
+        <a:xfrm>
+          <a:off x="0" y="0"/>
+          <a:ext cx="0" cy="0"/>
+          <a:chOff x="0" y="0"/>
+          <a:chExt cx="0" cy="0"/>
+        </a:xfrm>
+      </p:grpSpPr>
+      <p:sp>
+        <p:nvSpPr>
+          <p:cNvPr id="2" name="Title 1"/>
+          <p:cNvSpPr>
+            <a:spLocks noGrp="1"/>
+          </p:cNvSpPr>
+          <p:nvPr>
+            <p:ph type="title"/>
+          </p:nvPr>
+        </p:nvSpPr>
+        <p:spPr/>
+        <p:txBody>
+          <a:bodyPr/>
+          <a:lstStyle/>
+          <a:p>
             <a:r>
               <a:rPr lang="pl-PL" dirty="0" smtClean="0"/>
               <a:t>Boards</a:t>
@@ -7322,6 +7499,160 @@
     <p:extLst>
       <p:ext uri="{BB962C8B-B14F-4D97-AF65-F5344CB8AC3E}">
         <p14:creationId xmlns:p14="http://schemas.microsoft.com/office/powerpoint/2010/main" val="1157042315"/>
+      </p:ext>
+    </p:extLst>
+  </p:cSld>
+  <p:clrMapOvr>
+    <a:masterClrMapping/>
+  </p:clrMapOvr>
+</p:sld>
+</file>
+
+<file path=ppt/slides/slide23.xml><?xml version="1.0" encoding="utf-8"?>
+<p:sld xmlns:a="http://schemas.openxmlformats.org/drawingml/2006/main" xmlns:r="http://schemas.openxmlformats.org/officeDocument/2006/relationships" xmlns:p="http://schemas.openxmlformats.org/presentationml/2006/main">
+  <p:cSld>
+    <p:spTree>
+      <p:nvGrpSpPr>
+        <p:cNvPr id="1" name=""/>
+        <p:cNvGrpSpPr/>
+        <p:nvPr/>
+      </p:nvGrpSpPr>
+      <p:grpSpPr>
+        <a:xfrm>
+          <a:off x="0" y="0"/>
+          <a:ext cx="0" cy="0"/>
+          <a:chOff x="0" y="0"/>
+          <a:chExt cx="0" cy="0"/>
+        </a:xfrm>
+      </p:grpSpPr>
+      <p:sp>
+        <p:nvSpPr>
+          <p:cNvPr id="2" name="Title 1"/>
+          <p:cNvSpPr>
+            <a:spLocks noGrp="1"/>
+          </p:cNvSpPr>
+          <p:nvPr>
+            <p:ph type="title"/>
+          </p:nvPr>
+        </p:nvSpPr>
+        <p:spPr/>
+        <p:txBody>
+          <a:bodyPr/>
+          <a:lstStyle/>
+          <a:p>
+            <a:r>
+              <a:rPr lang="pl-PL" dirty="0" smtClean="0"/>
+              <a:t>StoryBoard</a:t>
+            </a:r>
+            <a:endParaRPr lang="pl-PL" dirty="0"/>
+          </a:p>
+        </p:txBody>
+      </p:sp>
+      <p:pic>
+        <p:nvPicPr>
+          <p:cNvPr id="3" name="Picture 2"/>
+          <p:cNvPicPr>
+            <a:picLocks noChangeAspect="1"/>
+          </p:cNvPicPr>
+          <p:nvPr/>
+        </p:nvPicPr>
+        <p:blipFill>
+          <a:blip r:embed="rId2"/>
+          <a:stretch>
+            <a:fillRect/>
+          </a:stretch>
+        </p:blipFill>
+        <p:spPr>
+          <a:xfrm>
+            <a:off x="677335" y="1930400"/>
+            <a:ext cx="7851852" cy="3696043"/>
+          </a:xfrm>
+          <a:prstGeom prst="rect">
+            <a:avLst/>
+          </a:prstGeom>
+        </p:spPr>
+      </p:pic>
+    </p:spTree>
+    <p:extLst>
+      <p:ext uri="{BB962C8B-B14F-4D97-AF65-F5344CB8AC3E}">
+        <p14:creationId xmlns:p14="http://schemas.microsoft.com/office/powerpoint/2010/main" val="2245658504"/>
+      </p:ext>
+    </p:extLst>
+  </p:cSld>
+  <p:clrMapOvr>
+    <a:masterClrMapping/>
+  </p:clrMapOvr>
+</p:sld>
+</file>
+
+<file path=ppt/slides/slide24.xml><?xml version="1.0" encoding="utf-8"?>
+<p:sld xmlns:a="http://schemas.openxmlformats.org/drawingml/2006/main" xmlns:r="http://schemas.openxmlformats.org/officeDocument/2006/relationships" xmlns:p="http://schemas.openxmlformats.org/presentationml/2006/main">
+  <p:cSld>
+    <p:spTree>
+      <p:nvGrpSpPr>
+        <p:cNvPr id="1" name=""/>
+        <p:cNvGrpSpPr/>
+        <p:nvPr/>
+      </p:nvGrpSpPr>
+      <p:grpSpPr>
+        <a:xfrm>
+          <a:off x="0" y="0"/>
+          <a:ext cx="0" cy="0"/>
+          <a:chOff x="0" y="0"/>
+          <a:chExt cx="0" cy="0"/>
+        </a:xfrm>
+      </p:grpSpPr>
+      <p:sp>
+        <p:nvSpPr>
+          <p:cNvPr id="2" name="Title 1"/>
+          <p:cNvSpPr>
+            <a:spLocks noGrp="1"/>
+          </p:cNvSpPr>
+          <p:nvPr>
+            <p:ph type="title"/>
+          </p:nvPr>
+        </p:nvSpPr>
+        <p:spPr/>
+        <p:txBody>
+          <a:bodyPr/>
+          <a:lstStyle/>
+          <a:p>
+            <a:r>
+              <a:rPr lang="pl-PL" dirty="0" smtClean="0"/>
+              <a:t>TaskBoard</a:t>
+            </a:r>
+            <a:endParaRPr lang="pl-PL" dirty="0"/>
+          </a:p>
+        </p:txBody>
+      </p:sp>
+      <p:pic>
+        <p:nvPicPr>
+          <p:cNvPr id="3" name="Picture 2"/>
+          <p:cNvPicPr>
+            <a:picLocks noChangeAspect="1"/>
+          </p:cNvPicPr>
+          <p:nvPr/>
+        </p:nvPicPr>
+        <p:blipFill>
+          <a:blip r:embed="rId2"/>
+          <a:stretch>
+            <a:fillRect/>
+          </a:stretch>
+        </p:blipFill>
+        <p:spPr>
+          <a:xfrm>
+            <a:off x="509587" y="2141837"/>
+            <a:ext cx="7867139" cy="4439937"/>
+          </a:xfrm>
+          <a:prstGeom prst="rect">
+            <a:avLst/>
+          </a:prstGeom>
+        </p:spPr>
+      </p:pic>
+    </p:spTree>
+    <p:extLst>
+      <p:ext uri="{BB962C8B-B14F-4D97-AF65-F5344CB8AC3E}">
+        <p14:creationId xmlns:p14="http://schemas.microsoft.com/office/powerpoint/2010/main" val="2086130643"/>
       </p:ext>
     </p:extLst>
   </p:cSld>
@@ -7588,7 +7919,6 @@
               <a:rPr lang="pl-PL" sz="1200" i="1" dirty="0"/>
               <a:t>https://docs.microsoft.com/en-us/azure/devops/learn/agile/what-is-agile-development</a:t>
             </a:r>
-            <a:endParaRPr lang="pl-PL" sz="1200" i="1" dirty="0"/>
           </a:p>
         </p:txBody>
       </p:sp>

</xml_diff>